<commit_message>
Small fixes to presentation and to the Controller and View in start folder
</commit_message>
<xml_diff>
--- a/Workshop_4/Presentasjon/Azureskolen-Workshop#4.pptx
+++ b/Workshop_4/Presentasjon/Azureskolen-Workshop#4.pptx
@@ -7,10 +7,10 @@
     <p:sldMasterId id="2147483705" r:id="rId6"/>
   </p:sldMasterIdLst>
   <p:notesMasterIdLst>
-    <p:notesMasterId r:id="rId17"/>
+    <p:notesMasterId r:id="rId18"/>
   </p:notesMasterIdLst>
   <p:handoutMasterIdLst>
-    <p:handoutMasterId r:id="rId18"/>
+    <p:handoutMasterId r:id="rId19"/>
   </p:handoutMasterIdLst>
   <p:sldIdLst>
     <p:sldId id="256" r:id="rId7"/>
@@ -22,7 +22,8 @@
     <p:sldId id="312" r:id="rId13"/>
     <p:sldId id="310" r:id="rId14"/>
     <p:sldId id="313" r:id="rId15"/>
-    <p:sldId id="275" r:id="rId16"/>
+    <p:sldId id="314" r:id="rId16"/>
+    <p:sldId id="275" r:id="rId17"/>
   </p:sldIdLst>
   <p:sldSz cx="12192000" cy="6858000"/>
   <p:notesSz cx="6858000" cy="9144000"/>
@@ -225,7 +226,7 @@
           <a:p>
             <a:fld id="{54C52192-B826-4AE0-9CD6-BEA9467D12B3}" type="datetimeFigureOut">
               <a:rPr lang="nb-NO" smtClean="0"/>
-              <a:t>12.11.2021</a:t>
+              <a:t>24.11.2021</a:t>
             </a:fld>
             <a:endParaRPr lang="nb-NO"/>
           </a:p>
@@ -390,7 +391,7 @@
           <a:p>
             <a:fld id="{2696BCB2-2760-41B1-A1BE-7886EF110FCB}" type="datetimeFigureOut">
               <a:rPr lang="nb-NO" smtClean="0"/>
-              <a:t>12.11.2021</a:t>
+              <a:t>24.11.2021</a:t>
             </a:fld>
             <a:endParaRPr lang="nb-NO"/>
           </a:p>
@@ -965,7 +966,7 @@
             </a:r>
           </a:p>
           <a:p>
-            <a:endParaRPr lang="en-US" dirty="0">
+            <a:endParaRPr lang="en-US">
               <a:cs typeface="Calibri"/>
             </a:endParaRPr>
           </a:p>
@@ -976,12 +977,9 @@
               </a:rPr>
               <a:t>Hadde man kunnet kjøre kode uten maskiner å kjøre det på, så ville det vært magi involvert</a:t>
             </a:r>
-            <a:endParaRPr lang="en-US" dirty="0">
-              <a:cs typeface="Calibri"/>
-            </a:endParaRPr>
-          </a:p>
-          <a:p>
-            <a:endParaRPr lang="en-US" dirty="0">
+          </a:p>
+          <a:p>
+            <a:endParaRPr lang="en-US">
               <a:cs typeface="Calibri"/>
             </a:endParaRPr>
           </a:p>
@@ -1000,9 +998,6 @@
               </a:rPr>
               <a:t>Enkelt forklart så ligger det en tjeneste som allokerer ressurser for å kunne starte opp koden.</a:t>
             </a:r>
-            <a:endParaRPr lang="en-US" dirty="0">
-              <a:cs typeface="Calibri"/>
-            </a:endParaRPr>
           </a:p>
           <a:p>
             <a:r>
@@ -1019,9 +1014,6 @@
               </a:rPr>
               <a:t>Måten dette gjøres på gjør at flere serverless applikasjoner kan bli kjørt på en server / vm samtidig. </a:t>
             </a:r>
-            <a:endParaRPr lang="en-US" dirty="0">
-              <a:cs typeface="Calibri"/>
-            </a:endParaRPr>
           </a:p>
           <a:p>
             <a:r>
@@ -1030,9 +1022,6 @@
               </a:rPr>
               <a:t>Applikasjonene kjøres som oftest I en form for container, slik at de ikke får tilgang til hverandres ressurser.</a:t>
             </a:r>
-            <a:endParaRPr lang="en-US" dirty="0">
-              <a:cs typeface="Calibri"/>
-            </a:endParaRPr>
           </a:p>
         </p:txBody>
       </p:sp>
@@ -1140,7 +1129,7 @@
           <a:p>
             <a:fld id="{180377DB-C4B0-49B2-8838-0F01BA83B7C4}" type="slidenum">
               <a:rPr lang="nb-NO" smtClean="0"/>
-              <a:t>10</a:t>
+              <a:t>11</a:t>
             </a:fld>
             <a:endParaRPr lang="nb-NO"/>
           </a:p>
@@ -10493,6 +10482,98 @@
           <p:cNvPr id="2" name="Content Placeholder 1">
             <a:extLst>
               <a:ext uri="{FF2B5EF4-FFF2-40B4-BE49-F238E27FC236}">
+                <a16:creationId xmlns:a16="http://schemas.microsoft.com/office/drawing/2014/main" id="{BA662726-BA9A-45CA-AE4B-4AA1E5D2FA55}"/>
+              </a:ext>
+            </a:extLst>
+          </p:cNvPr>
+          <p:cNvSpPr>
+            <a:spLocks noGrp="1"/>
+          </p:cNvSpPr>
+          <p:nvPr>
+            <p:ph idx="1"/>
+          </p:nvPr>
+        </p:nvSpPr>
+        <p:spPr/>
+        <p:txBody>
+          <a:bodyPr/>
+          <a:lstStyle/>
+          <a:p>
+            <a:r>
+              <a:rPr lang="nb-NO" dirty="0">
+                <a:hlinkClick r:id="rId2"/>
+              </a:rPr>
+              <a:t>https://pettergcqhlibkyuetdm-wa.azurewebsites.net/</a:t>
+            </a:r>
+            <a:r>
+              <a:rPr lang="nb-NO" dirty="0"/>
+              <a:t> </a:t>
+            </a:r>
+          </a:p>
+        </p:txBody>
+      </p:sp>
+      <p:sp>
+        <p:nvSpPr>
+          <p:cNvPr id="3" name="Title 2">
+            <a:extLst>
+              <a:ext uri="{FF2B5EF4-FFF2-40B4-BE49-F238E27FC236}">
+                <a16:creationId xmlns:a16="http://schemas.microsoft.com/office/drawing/2014/main" id="{DCBA8782-FB09-4F16-978F-9597B4CACD8B}"/>
+              </a:ext>
+            </a:extLst>
+          </p:cNvPr>
+          <p:cNvSpPr>
+            <a:spLocks noGrp="1"/>
+          </p:cNvSpPr>
+          <p:nvPr>
+            <p:ph type="title"/>
+          </p:nvPr>
+        </p:nvSpPr>
+        <p:spPr/>
+        <p:txBody>
+          <a:bodyPr/>
+          <a:lstStyle/>
+          <a:p>
+            <a:r>
+              <a:rPr lang="nb-NO" dirty="0"/>
+              <a:t>Demo</a:t>
+            </a:r>
+          </a:p>
+        </p:txBody>
+      </p:sp>
+    </p:spTree>
+    <p:extLst>
+      <p:ext uri="{BB962C8B-B14F-4D97-AF65-F5344CB8AC3E}">
+        <p14:creationId xmlns:p14="http://schemas.microsoft.com/office/powerpoint/2010/main" val="4265346023"/>
+      </p:ext>
+    </p:extLst>
+  </p:cSld>
+  <p:clrMapOvr>
+    <a:masterClrMapping/>
+  </p:clrMapOvr>
+</p:sld>
+</file>
+
+<file path=ppt/slides/slide11.xml><?xml version="1.0" encoding="utf-8"?>
+<p:sld xmlns:a="http://schemas.openxmlformats.org/drawingml/2006/main" xmlns:r="http://schemas.openxmlformats.org/officeDocument/2006/relationships" xmlns:p="http://schemas.openxmlformats.org/presentationml/2006/main">
+  <p:cSld>
+    <p:spTree>
+      <p:nvGrpSpPr>
+        <p:cNvPr id="1" name=""/>
+        <p:cNvGrpSpPr/>
+        <p:nvPr/>
+      </p:nvGrpSpPr>
+      <p:grpSpPr>
+        <a:xfrm>
+          <a:off x="0" y="0"/>
+          <a:ext cx="0" cy="0"/>
+          <a:chOff x="0" y="0"/>
+          <a:chExt cx="0" cy="0"/>
+        </a:xfrm>
+      </p:grpSpPr>
+      <p:sp>
+        <p:nvSpPr>
+          <p:cNvPr id="2" name="Content Placeholder 1">
+            <a:extLst>
+              <a:ext uri="{FF2B5EF4-FFF2-40B4-BE49-F238E27FC236}">
                 <a16:creationId xmlns:a16="http://schemas.microsoft.com/office/drawing/2014/main" id="{94B98822-8368-4C2D-B1AB-DBC5C478A3C8}"/>
               </a:ext>
             </a:extLst>
@@ -11376,18 +11457,13 @@
           <a:lstStyle/>
           <a:p>
             <a:r>
-              <a:rPr lang="nb-NO" dirty="0"/>
-              <a:t>Logging / </a:t>
-            </a:r>
-            <a:r>
-              <a:rPr lang="nb-NO" dirty="0" err="1"/>
-              <a:t>Monitorering</a:t>
-            </a:r>
-            <a:endParaRPr lang="nb-NO" dirty="0"/>
-          </a:p>
-          <a:p>
-            <a:r>
-              <a:rPr lang="nb-NO" dirty="0"/>
+              <a:rPr lang="nb-NO"/>
+              <a:t>Logging / Monitorering</a:t>
+            </a:r>
+          </a:p>
+          <a:p>
+            <a:r>
+              <a:rPr lang="nb-NO"/>
               <a:t>(Application Insights )</a:t>
             </a:r>
           </a:p>
@@ -11457,7 +11533,7 @@
         <p:spPr>
           <a:xfrm>
             <a:off x="4949716" y="4169803"/>
-            <a:ext cx="1561749" cy="615553"/>
+            <a:ext cx="1561749" cy="584775"/>
           </a:xfrm>
           <a:prstGeom prst="rect">
             <a:avLst/>
@@ -11471,16 +11547,8 @@
           <a:lstStyle/>
           <a:p>
             <a:r>
-              <a:rPr lang="nb-NO" sz="1600" dirty="0"/>
-              <a:t>«VM» (App Service </a:t>
-            </a:r>
-            <a:r>
-              <a:rPr lang="nb-NO" dirty="0"/>
-              <a:t>Plan</a:t>
-            </a:r>
-            <a:r>
-              <a:rPr lang="nb-NO" sz="1600" dirty="0"/>
-              <a:t>)</a:t>
+              <a:rPr lang="nb-NO" sz="1600"/>
+              <a:t>App Service Plan («VM»)</a:t>
             </a:r>
           </a:p>
         </p:txBody>
@@ -11701,211 +11769,34 @@
       </p:sp>
       <p:pic>
         <p:nvPicPr>
-          <p:cNvPr id="1026" name="Picture 2">
+          <p:cNvPr id="2" name="Picture 3" descr="Logo, icon&#10;&#10;Description automatically generated">
             <a:extLst>
               <a:ext uri="{FF2B5EF4-FFF2-40B4-BE49-F238E27FC236}">
-                <a16:creationId xmlns:a16="http://schemas.microsoft.com/office/drawing/2014/main" id="{14D9BAE0-0F18-4B77-955F-419E97915F11}"/>
+                <a16:creationId xmlns:a16="http://schemas.microsoft.com/office/drawing/2014/main" id="{8DBC1619-2A60-4713-B313-27BB4BA1D1A8}"/>
               </a:ext>
             </a:extLst>
           </p:cNvPr>
           <p:cNvPicPr>
-            <a:picLocks noChangeAspect="1" noChangeArrowheads="1"/>
+            <a:picLocks noChangeAspect="1"/>
           </p:cNvPicPr>
           <p:nvPr/>
         </p:nvPicPr>
         <p:blipFill>
-          <a:blip r:embed="rId11">
-            <a:extLst>
-              <a:ext uri="{28A0092B-C50C-407E-A947-70E740481C1C}">
-                <a14:useLocalDpi xmlns:a14="http://schemas.microsoft.com/office/drawing/2010/main" val="0"/>
-              </a:ext>
-            </a:extLst>
-          </a:blip>
-          <a:srcRect/>
+          <a:blip r:embed="rId11"/>
           <a:stretch>
             <a:fillRect/>
           </a:stretch>
         </p:blipFill>
-        <p:spPr bwMode="auto">
+        <p:spPr>
           <a:xfrm>
-            <a:off x="7432595" y="5130980"/>
-            <a:ext cx="710498" cy="495393"/>
+            <a:off x="9033726" y="3146075"/>
+            <a:ext cx="1771472" cy="1248125"/>
           </a:xfrm>
           <a:prstGeom prst="rect">
             <a:avLst/>
           </a:prstGeom>
-          <a:noFill/>
-          <a:extLst>
-            <a:ext uri="{909E8E84-426E-40DD-AFC4-6F175D3DCCD1}">
-              <a14:hiddenFill xmlns:a14="http://schemas.microsoft.com/office/drawing/2010/main">
-                <a:solidFill>
-                  <a:srgbClr val="FFFFFF"/>
-                </a:solidFill>
-              </a14:hiddenFill>
-            </a:ext>
-          </a:extLst>
         </p:spPr>
       </p:pic>
-      <p:cxnSp>
-        <p:nvCxnSpPr>
-          <p:cNvPr id="17" name="Straight Arrow Connector 16">
-            <a:extLst>
-              <a:ext uri="{FF2B5EF4-FFF2-40B4-BE49-F238E27FC236}">
-                <a16:creationId xmlns:a16="http://schemas.microsoft.com/office/drawing/2014/main" id="{2224AEE6-5350-4A1C-B7EA-8A623D1A8A00}"/>
-              </a:ext>
-            </a:extLst>
-          </p:cNvPr>
-          <p:cNvCxnSpPr>
-            <a:cxnSpLocks/>
-            <a:stCxn id="1026" idx="1"/>
-            <a:endCxn id="27" idx="3"/>
-          </p:cNvCxnSpPr>
-          <p:nvPr/>
-        </p:nvCxnSpPr>
-        <p:spPr>
-          <a:xfrm flipH="1" flipV="1">
-            <a:off x="4759407" y="5369105"/>
-            <a:ext cx="2673188" cy="9572"/>
-          </a:xfrm>
-          <a:prstGeom prst="straightConnector1">
-            <a:avLst/>
-          </a:prstGeom>
-          <a:ln w="9525" cap="flat" cmpd="sng" algn="ctr">
-            <a:solidFill>
-              <a:schemeClr val="dk1"/>
-            </a:solidFill>
-            <a:prstDash val="solid"/>
-            <a:round/>
-            <a:headEnd type="arrow" w="med" len="med"/>
-            <a:tailEnd type="arrow" w="med" len="med"/>
-          </a:ln>
-        </p:spPr>
-        <p:style>
-          <a:lnRef idx="0">
-            <a:scrgbClr r="0" g="0" b="0"/>
-          </a:lnRef>
-          <a:fillRef idx="0">
-            <a:scrgbClr r="0" g="0" b="0"/>
-          </a:fillRef>
-          <a:effectRef idx="0">
-            <a:scrgbClr r="0" g="0" b="0"/>
-          </a:effectRef>
-          <a:fontRef idx="minor">
-            <a:schemeClr val="tx1"/>
-          </a:fontRef>
-        </p:style>
-      </p:cxnSp>
-      <p:sp>
-        <p:nvSpPr>
-          <p:cNvPr id="20" name="TextBox 19">
-            <a:extLst>
-              <a:ext uri="{FF2B5EF4-FFF2-40B4-BE49-F238E27FC236}">
-                <a16:creationId xmlns:a16="http://schemas.microsoft.com/office/drawing/2014/main" id="{5FAB53F9-81F6-44DA-8BED-3D82A494BCC0}"/>
-              </a:ext>
-            </a:extLst>
-          </p:cNvPr>
-          <p:cNvSpPr txBox="1"/>
-          <p:nvPr/>
-        </p:nvSpPr>
-        <p:spPr>
-          <a:xfrm>
-            <a:off x="7086860" y="5698636"/>
-            <a:ext cx="1794871" cy="584775"/>
-          </a:xfrm>
-          <a:prstGeom prst="rect">
-            <a:avLst/>
-          </a:prstGeom>
-          <a:noFill/>
-        </p:spPr>
-        <p:txBody>
-          <a:bodyPr wrap="square" rtlCol="0">
-            <a:spAutoFit/>
-          </a:bodyPr>
-          <a:lstStyle/>
-          <a:p>
-            <a:r>
-              <a:rPr lang="nb-NO" sz="1600" dirty="0"/>
-              <a:t>Bildemanipulering</a:t>
-            </a:r>
-            <a:br>
-              <a:rPr lang="nb-NO" sz="1600" dirty="0"/>
-            </a:br>
-            <a:r>
-              <a:rPr lang="nb-NO" sz="1600" dirty="0"/>
-              <a:t>(</a:t>
-            </a:r>
-            <a:r>
-              <a:rPr lang="nb-NO" sz="1600" dirty="0" err="1"/>
-              <a:t>Azure</a:t>
-            </a:r>
-            <a:r>
-              <a:rPr lang="nb-NO" sz="1600" dirty="0"/>
-              <a:t> </a:t>
-            </a:r>
-            <a:r>
-              <a:rPr lang="nb-NO" sz="1600" dirty="0" err="1"/>
-              <a:t>Function</a:t>
-            </a:r>
-            <a:r>
-              <a:rPr lang="nb-NO" sz="1600" dirty="0"/>
-              <a:t>)</a:t>
-            </a:r>
-          </a:p>
-        </p:txBody>
-      </p:sp>
-      <p:sp>
-        <p:nvSpPr>
-          <p:cNvPr id="10" name="Rectangle 9">
-            <a:extLst>
-              <a:ext uri="{FF2B5EF4-FFF2-40B4-BE49-F238E27FC236}">
-                <a16:creationId xmlns:a16="http://schemas.microsoft.com/office/drawing/2014/main" id="{33E2197E-9387-437D-9D38-B309A8BC2F00}"/>
-              </a:ext>
-            </a:extLst>
-          </p:cNvPr>
-          <p:cNvSpPr/>
-          <p:nvPr/>
-        </p:nvSpPr>
-        <p:spPr>
-          <a:xfrm>
-            <a:off x="6641805" y="4919330"/>
-            <a:ext cx="2452576" cy="1516113"/>
-          </a:xfrm>
-          <a:prstGeom prst="rect">
-            <a:avLst/>
-          </a:prstGeom>
-          <a:noFill/>
-          <a:ln>
-            <a:solidFill>
-              <a:srgbClr val="FF0000"/>
-            </a:solidFill>
-            <a:prstDash val="sysDot"/>
-          </a:ln>
-        </p:spPr>
-        <p:style>
-          <a:lnRef idx="2">
-            <a:schemeClr val="accent1">
-              <a:shade val="50000"/>
-            </a:schemeClr>
-          </a:lnRef>
-          <a:fillRef idx="1">
-            <a:schemeClr val="accent1"/>
-          </a:fillRef>
-          <a:effectRef idx="0">
-            <a:schemeClr val="accent1"/>
-          </a:effectRef>
-          <a:fontRef idx="minor">
-            <a:schemeClr val="lt1"/>
-          </a:fontRef>
-        </p:style>
-        <p:txBody>
-          <a:bodyPr rtlCol="0" anchor="ctr"/>
-          <a:lstStyle/>
-          <a:p>
-            <a:pPr algn="ctr"/>
-            <a:endParaRPr lang="nb-NO"/>
-          </a:p>
-        </p:txBody>
-      </p:sp>
     </p:spTree>
     <p:extLst>
       <p:ext uri="{BB962C8B-B14F-4D97-AF65-F5344CB8AC3E}">
@@ -11916,354 +11807,6 @@
   <p:clrMapOvr>
     <a:masterClrMapping/>
   </p:clrMapOvr>
-  <p:timing>
-    <p:tnLst>
-      <p:par>
-        <p:cTn id="1" dur="indefinite" restart="never" nodeType="tmRoot">
-          <p:childTnLst>
-            <p:seq concurrent="1" nextAc="seek">
-              <p:cTn id="2" dur="indefinite" nodeType="mainSeq">
-                <p:childTnLst>
-                  <p:par>
-                    <p:cTn id="3" fill="hold">
-                      <p:stCondLst>
-                        <p:cond delay="indefinite"/>
-                      </p:stCondLst>
-                      <p:childTnLst>
-                        <p:par>
-                          <p:cTn id="4" fill="hold">
-                            <p:stCondLst>
-                              <p:cond delay="0"/>
-                            </p:stCondLst>
-                            <p:childTnLst>
-                              <p:par>
-                                <p:cTn id="5" presetID="42" presetClass="entr" presetSubtype="0" fill="hold" nodeType="clickEffect">
-                                  <p:stCondLst>
-                                    <p:cond delay="0"/>
-                                  </p:stCondLst>
-                                  <p:childTnLst>
-                                    <p:set>
-                                      <p:cBhvr>
-                                        <p:cTn id="6" dur="1" fill="hold">
-                                          <p:stCondLst>
-                                            <p:cond delay="0"/>
-                                          </p:stCondLst>
-                                        </p:cTn>
-                                        <p:tgtEl>
-                                          <p:spTgt spid="17"/>
-                                        </p:tgtEl>
-                                        <p:attrNameLst>
-                                          <p:attrName>style.visibility</p:attrName>
-                                        </p:attrNameLst>
-                                      </p:cBhvr>
-                                      <p:to>
-                                        <p:strVal val="visible"/>
-                                      </p:to>
-                                    </p:set>
-                                    <p:animEffect transition="in" filter="fade">
-                                      <p:cBhvr>
-                                        <p:cTn id="7" dur="1000"/>
-                                        <p:tgtEl>
-                                          <p:spTgt spid="17"/>
-                                        </p:tgtEl>
-                                      </p:cBhvr>
-                                    </p:animEffect>
-                                    <p:anim calcmode="lin" valueType="num">
-                                      <p:cBhvr>
-                                        <p:cTn id="8" dur="1000" fill="hold"/>
-                                        <p:tgtEl>
-                                          <p:spTgt spid="17"/>
-                                        </p:tgtEl>
-                                        <p:attrNameLst>
-                                          <p:attrName>ppt_x</p:attrName>
-                                        </p:attrNameLst>
-                                      </p:cBhvr>
-                                      <p:tavLst>
-                                        <p:tav tm="0">
-                                          <p:val>
-                                            <p:strVal val="#ppt_x"/>
-                                          </p:val>
-                                        </p:tav>
-                                        <p:tav tm="100000">
-                                          <p:val>
-                                            <p:strVal val="#ppt_x"/>
-                                          </p:val>
-                                        </p:tav>
-                                      </p:tavLst>
-                                    </p:anim>
-                                    <p:anim calcmode="lin" valueType="num">
-                                      <p:cBhvr>
-                                        <p:cTn id="9" dur="1000" fill="hold"/>
-                                        <p:tgtEl>
-                                          <p:spTgt spid="17"/>
-                                        </p:tgtEl>
-                                        <p:attrNameLst>
-                                          <p:attrName>ppt_y</p:attrName>
-                                        </p:attrNameLst>
-                                      </p:cBhvr>
-                                      <p:tavLst>
-                                        <p:tav tm="0">
-                                          <p:val>
-                                            <p:strVal val="#ppt_y+.1"/>
-                                          </p:val>
-                                        </p:tav>
-                                        <p:tav tm="100000">
-                                          <p:val>
-                                            <p:strVal val="#ppt_y"/>
-                                          </p:val>
-                                        </p:tav>
-                                      </p:tavLst>
-                                    </p:anim>
-                                  </p:childTnLst>
-                                </p:cTn>
-                              </p:par>
-                              <p:par>
-                                <p:cTn id="10" presetID="42" presetClass="entr" presetSubtype="0" fill="hold" nodeType="withEffect">
-                                  <p:stCondLst>
-                                    <p:cond delay="0"/>
-                                  </p:stCondLst>
-                                  <p:childTnLst>
-                                    <p:set>
-                                      <p:cBhvr>
-                                        <p:cTn id="11" dur="1" fill="hold">
-                                          <p:stCondLst>
-                                            <p:cond delay="0"/>
-                                          </p:stCondLst>
-                                        </p:cTn>
-                                        <p:tgtEl>
-                                          <p:spTgt spid="1026"/>
-                                        </p:tgtEl>
-                                        <p:attrNameLst>
-                                          <p:attrName>style.visibility</p:attrName>
-                                        </p:attrNameLst>
-                                      </p:cBhvr>
-                                      <p:to>
-                                        <p:strVal val="visible"/>
-                                      </p:to>
-                                    </p:set>
-                                    <p:animEffect transition="in" filter="fade">
-                                      <p:cBhvr>
-                                        <p:cTn id="12" dur="1000"/>
-                                        <p:tgtEl>
-                                          <p:spTgt spid="1026"/>
-                                        </p:tgtEl>
-                                      </p:cBhvr>
-                                    </p:animEffect>
-                                    <p:anim calcmode="lin" valueType="num">
-                                      <p:cBhvr>
-                                        <p:cTn id="13" dur="1000" fill="hold"/>
-                                        <p:tgtEl>
-                                          <p:spTgt spid="1026"/>
-                                        </p:tgtEl>
-                                        <p:attrNameLst>
-                                          <p:attrName>ppt_x</p:attrName>
-                                        </p:attrNameLst>
-                                      </p:cBhvr>
-                                      <p:tavLst>
-                                        <p:tav tm="0">
-                                          <p:val>
-                                            <p:strVal val="#ppt_x"/>
-                                          </p:val>
-                                        </p:tav>
-                                        <p:tav tm="100000">
-                                          <p:val>
-                                            <p:strVal val="#ppt_x"/>
-                                          </p:val>
-                                        </p:tav>
-                                      </p:tavLst>
-                                    </p:anim>
-                                    <p:anim calcmode="lin" valueType="num">
-                                      <p:cBhvr>
-                                        <p:cTn id="14" dur="1000" fill="hold"/>
-                                        <p:tgtEl>
-                                          <p:spTgt spid="1026"/>
-                                        </p:tgtEl>
-                                        <p:attrNameLst>
-                                          <p:attrName>ppt_y</p:attrName>
-                                        </p:attrNameLst>
-                                      </p:cBhvr>
-                                      <p:tavLst>
-                                        <p:tav tm="0">
-                                          <p:val>
-                                            <p:strVal val="#ppt_y+.1"/>
-                                          </p:val>
-                                        </p:tav>
-                                        <p:tav tm="100000">
-                                          <p:val>
-                                            <p:strVal val="#ppt_y"/>
-                                          </p:val>
-                                        </p:tav>
-                                      </p:tavLst>
-                                    </p:anim>
-                                  </p:childTnLst>
-                                </p:cTn>
-                              </p:par>
-                              <p:par>
-                                <p:cTn id="15" presetID="42" presetClass="entr" presetSubtype="0" fill="hold" grpId="0" nodeType="withEffect">
-                                  <p:stCondLst>
-                                    <p:cond delay="0"/>
-                                  </p:stCondLst>
-                                  <p:childTnLst>
-                                    <p:set>
-                                      <p:cBhvr>
-                                        <p:cTn id="16" dur="1" fill="hold">
-                                          <p:stCondLst>
-                                            <p:cond delay="0"/>
-                                          </p:stCondLst>
-                                        </p:cTn>
-                                        <p:tgtEl>
-                                          <p:spTgt spid="20"/>
-                                        </p:tgtEl>
-                                        <p:attrNameLst>
-                                          <p:attrName>style.visibility</p:attrName>
-                                        </p:attrNameLst>
-                                      </p:cBhvr>
-                                      <p:to>
-                                        <p:strVal val="visible"/>
-                                      </p:to>
-                                    </p:set>
-                                    <p:animEffect transition="in" filter="fade">
-                                      <p:cBhvr>
-                                        <p:cTn id="17" dur="1000"/>
-                                        <p:tgtEl>
-                                          <p:spTgt spid="20"/>
-                                        </p:tgtEl>
-                                      </p:cBhvr>
-                                    </p:animEffect>
-                                    <p:anim calcmode="lin" valueType="num">
-                                      <p:cBhvr>
-                                        <p:cTn id="18" dur="1000" fill="hold"/>
-                                        <p:tgtEl>
-                                          <p:spTgt spid="20"/>
-                                        </p:tgtEl>
-                                        <p:attrNameLst>
-                                          <p:attrName>ppt_x</p:attrName>
-                                        </p:attrNameLst>
-                                      </p:cBhvr>
-                                      <p:tavLst>
-                                        <p:tav tm="0">
-                                          <p:val>
-                                            <p:strVal val="#ppt_x"/>
-                                          </p:val>
-                                        </p:tav>
-                                        <p:tav tm="100000">
-                                          <p:val>
-                                            <p:strVal val="#ppt_x"/>
-                                          </p:val>
-                                        </p:tav>
-                                      </p:tavLst>
-                                    </p:anim>
-                                    <p:anim calcmode="lin" valueType="num">
-                                      <p:cBhvr>
-                                        <p:cTn id="19" dur="1000" fill="hold"/>
-                                        <p:tgtEl>
-                                          <p:spTgt spid="20"/>
-                                        </p:tgtEl>
-                                        <p:attrNameLst>
-                                          <p:attrName>ppt_y</p:attrName>
-                                        </p:attrNameLst>
-                                      </p:cBhvr>
-                                      <p:tavLst>
-                                        <p:tav tm="0">
-                                          <p:val>
-                                            <p:strVal val="#ppt_y+.1"/>
-                                          </p:val>
-                                        </p:tav>
-                                        <p:tav tm="100000">
-                                          <p:val>
-                                            <p:strVal val="#ppt_y"/>
-                                          </p:val>
-                                        </p:tav>
-                                      </p:tavLst>
-                                    </p:anim>
-                                  </p:childTnLst>
-                                </p:cTn>
-                              </p:par>
-                            </p:childTnLst>
-                          </p:cTn>
-                        </p:par>
-                      </p:childTnLst>
-                    </p:cTn>
-                  </p:par>
-                  <p:par>
-                    <p:cTn id="20" fill="hold">
-                      <p:stCondLst>
-                        <p:cond delay="indefinite"/>
-                      </p:stCondLst>
-                      <p:childTnLst>
-                        <p:par>
-                          <p:cTn id="21" fill="hold">
-                            <p:stCondLst>
-                              <p:cond delay="0"/>
-                            </p:stCondLst>
-                            <p:childTnLst>
-                              <p:par>
-                                <p:cTn id="22" presetID="10" presetClass="entr" presetSubtype="0" fill="hold" grpId="0" nodeType="clickEffect">
-                                  <p:stCondLst>
-                                    <p:cond delay="0"/>
-                                  </p:stCondLst>
-                                  <p:childTnLst>
-                                    <p:set>
-                                      <p:cBhvr>
-                                        <p:cTn id="23" dur="1" fill="hold">
-                                          <p:stCondLst>
-                                            <p:cond delay="0"/>
-                                          </p:stCondLst>
-                                        </p:cTn>
-                                        <p:tgtEl>
-                                          <p:spTgt spid="10"/>
-                                        </p:tgtEl>
-                                        <p:attrNameLst>
-                                          <p:attrName>style.visibility</p:attrName>
-                                        </p:attrNameLst>
-                                      </p:cBhvr>
-                                      <p:to>
-                                        <p:strVal val="visible"/>
-                                      </p:to>
-                                    </p:set>
-                                    <p:animEffect transition="in" filter="fade">
-                                      <p:cBhvr>
-                                        <p:cTn id="24" dur="500"/>
-                                        <p:tgtEl>
-                                          <p:spTgt spid="10"/>
-                                        </p:tgtEl>
-                                      </p:cBhvr>
-                                    </p:animEffect>
-                                  </p:childTnLst>
-                                </p:cTn>
-                              </p:par>
-                            </p:childTnLst>
-                          </p:cTn>
-                        </p:par>
-                      </p:childTnLst>
-                    </p:cTn>
-                  </p:par>
-                </p:childTnLst>
-              </p:cTn>
-              <p:prevCondLst>
-                <p:cond evt="onPrev" delay="0">
-                  <p:tgtEl>
-                    <p:sldTgt/>
-                  </p:tgtEl>
-                </p:cond>
-              </p:prevCondLst>
-              <p:nextCondLst>
-                <p:cond evt="onNext" delay="0">
-                  <p:tgtEl>
-                    <p:sldTgt/>
-                  </p:tgtEl>
-                </p:cond>
-              </p:nextCondLst>
-            </p:seq>
-          </p:childTnLst>
-        </p:cTn>
-      </p:par>
-    </p:tnLst>
-    <p:bldLst>
-      <p:bldP spid="20" grpId="0"/>
-      <p:bldP spid="10" grpId="0" animBg="1"/>
-    </p:bldLst>
-  </p:timing>
 </p:sld>
 </file>
 
@@ -12626,68 +12169,68 @@
           <a:lstStyle/>
           <a:p>
             <a:r>
-              <a:rPr lang="nb-NO" dirty="0">
+              <a:rPr lang="nb-NO">
                 <a:cs typeface="Calibri"/>
               </a:rPr>
               <a:t>Er en </a:t>
             </a:r>
             <a:r>
-              <a:rPr lang="nb-NO" dirty="0" err="1">
+              <a:rPr lang="nb-NO" err="1">
                 <a:cs typeface="Calibri"/>
               </a:rPr>
               <a:t>serverless</a:t>
             </a:r>
             <a:r>
-              <a:rPr lang="nb-NO" dirty="0">
+              <a:rPr lang="nb-NO">
                 <a:cs typeface="Calibri"/>
               </a:rPr>
               <a:t> tjeneste i </a:t>
             </a:r>
             <a:r>
-              <a:rPr lang="nb-NO" dirty="0" err="1">
+              <a:rPr lang="nb-NO" err="1">
                 <a:cs typeface="Calibri"/>
               </a:rPr>
               <a:t>Azure</a:t>
             </a:r>
-            <a:endParaRPr lang="nb-NO" dirty="0">
+            <a:endParaRPr lang="nb-NO">
               <a:cs typeface="Calibri"/>
             </a:endParaRPr>
           </a:p>
           <a:p>
-            <a:endParaRPr lang="nb-NO" dirty="0">
+            <a:endParaRPr lang="nb-NO">
               <a:cs typeface="Calibri"/>
             </a:endParaRPr>
           </a:p>
           <a:p>
             <a:r>
-              <a:rPr lang="nb-NO" dirty="0">
+              <a:rPr lang="nb-NO">
                 <a:cs typeface="Calibri"/>
               </a:rPr>
               <a:t>Reduserer mengden med kode</a:t>
             </a:r>
-            <a:endParaRPr lang="nb-NO" dirty="0"/>
-          </a:p>
-          <a:p>
-            <a:endParaRPr lang="nb-NO" dirty="0">
+            <a:endParaRPr lang="nb-NO"/>
+          </a:p>
+          <a:p>
+            <a:endParaRPr lang="nb-NO">
               <a:cs typeface="Calibri"/>
             </a:endParaRPr>
           </a:p>
           <a:p>
             <a:r>
-              <a:rPr lang="nb-NO" dirty="0">
+              <a:rPr lang="nb-NO">
                 <a:cs typeface="Calibri"/>
               </a:rPr>
               <a:t>Lettere infrastruktur</a:t>
             </a:r>
           </a:p>
           <a:p>
-            <a:endParaRPr lang="nb-NO" dirty="0">
+            <a:endParaRPr lang="nb-NO">
               <a:cs typeface="Calibri"/>
             </a:endParaRPr>
           </a:p>
           <a:p>
             <a:r>
-              <a:rPr lang="nb-NO" dirty="0">
+              <a:rPr lang="nb-NO">
                 <a:cs typeface="Calibri"/>
               </a:rPr>
               <a:t>Alltid oppdatert</a:t>
@@ -12818,30 +12361,288 @@
             </a:r>
           </a:p>
           <a:p>
+            <a:pPr lvl="1"/>
+            <a:r>
+              <a:rPr lang="en-US" err="1">
+                <a:cs typeface="Calibri"/>
+              </a:rPr>
+              <a:t>Reagere</a:t>
+            </a:r>
+            <a:r>
+              <a:rPr lang="en-US">
+                <a:cs typeface="Calibri"/>
+              </a:rPr>
+              <a:t> </a:t>
+            </a:r>
+            <a:r>
+              <a:rPr lang="en-US" err="1">
+                <a:cs typeface="Calibri"/>
+              </a:rPr>
+              <a:t>på</a:t>
+            </a:r>
+            <a:r>
+              <a:rPr lang="en-US">
+                <a:cs typeface="Calibri"/>
+              </a:rPr>
+              <a:t> at </a:t>
+            </a:r>
+            <a:r>
+              <a:rPr lang="en-US" err="1">
+                <a:cs typeface="Calibri"/>
+              </a:rPr>
+              <a:t>noe</a:t>
+            </a:r>
+            <a:r>
+              <a:rPr lang="en-US">
+                <a:cs typeface="Calibri"/>
+              </a:rPr>
+              <a:t> </a:t>
+            </a:r>
+            <a:r>
+              <a:rPr lang="en-US" err="1">
+                <a:cs typeface="Calibri"/>
+              </a:rPr>
+              <a:t>har</a:t>
+            </a:r>
+            <a:r>
+              <a:rPr lang="en-US">
+                <a:cs typeface="Calibri"/>
+              </a:rPr>
+              <a:t> </a:t>
+            </a:r>
+            <a:r>
+              <a:rPr lang="en-US" err="1">
+                <a:cs typeface="Calibri"/>
+              </a:rPr>
+              <a:t>skjedd</a:t>
+            </a:r>
             <a:endParaRPr lang="en-US">
               <a:cs typeface="Calibri"/>
             </a:endParaRPr>
           </a:p>
           <a:p>
+            <a:pPr lvl="2"/>
             <a:r>
               <a:rPr lang="en-US">
                 <a:cs typeface="Calibri"/>
               </a:rPr>
-              <a:t>Bindings</a:t>
-            </a:r>
-          </a:p>
-          <a:p>
+              <a:t>HTTP </a:t>
+            </a:r>
+            <a:r>
+              <a:rPr lang="en-US" err="1">
+                <a:cs typeface="Calibri"/>
+              </a:rPr>
+              <a:t>kall</a:t>
+            </a:r>
             <a:endParaRPr lang="en-US">
               <a:cs typeface="Calibri"/>
             </a:endParaRPr>
           </a:p>
           <a:p>
+            <a:pPr lvl="2"/>
             <a:r>
               <a:rPr lang="en-US">
                 <a:cs typeface="Calibri"/>
               </a:rPr>
-              <a:t>Output</a:t>
-            </a:r>
+              <a:t>Melding </a:t>
+            </a:r>
+            <a:r>
+              <a:rPr lang="en-US" err="1">
+                <a:cs typeface="Calibri"/>
+              </a:rPr>
+              <a:t>lagt</a:t>
+            </a:r>
+            <a:r>
+              <a:rPr lang="en-US">
+                <a:cs typeface="Calibri"/>
+              </a:rPr>
+              <a:t> </a:t>
+            </a:r>
+            <a:r>
+              <a:rPr lang="en-US" err="1">
+                <a:cs typeface="Calibri"/>
+              </a:rPr>
+              <a:t>til</a:t>
+            </a:r>
+            <a:r>
+              <a:rPr lang="en-US">
+                <a:cs typeface="Calibri"/>
+              </a:rPr>
+              <a:t> </a:t>
+            </a:r>
+            <a:r>
+              <a:rPr lang="en-US" err="1">
+                <a:cs typeface="Calibri"/>
+              </a:rPr>
+              <a:t>på</a:t>
+            </a:r>
+            <a:r>
+              <a:rPr lang="en-US">
+                <a:cs typeface="Calibri"/>
+              </a:rPr>
+              <a:t> </a:t>
+            </a:r>
+            <a:r>
+              <a:rPr lang="en-US" err="1">
+                <a:cs typeface="Calibri"/>
+              </a:rPr>
+              <a:t>kø</a:t>
+            </a:r>
+            <a:endParaRPr lang="en-US">
+              <a:cs typeface="Calibri"/>
+            </a:endParaRPr>
+          </a:p>
+          <a:p>
+            <a:endParaRPr lang="en-US">
+              <a:cs typeface="Calibri"/>
+            </a:endParaRPr>
+          </a:p>
+          <a:p>
+            <a:r>
+              <a:rPr lang="en-US">
+                <a:cs typeface="Calibri"/>
+              </a:rPr>
+              <a:t>Input binding</a:t>
+            </a:r>
+          </a:p>
+          <a:p>
+            <a:pPr lvl="1"/>
+            <a:r>
+              <a:rPr lang="en-US" err="1">
+                <a:cs typeface="Calibri"/>
+              </a:rPr>
+              <a:t>Lesetilgang</a:t>
+            </a:r>
+            <a:r>
+              <a:rPr lang="en-US">
+                <a:cs typeface="Calibri"/>
+              </a:rPr>
+              <a:t> </a:t>
+            </a:r>
+            <a:r>
+              <a:rPr lang="en-US" err="1">
+                <a:cs typeface="Calibri"/>
+              </a:rPr>
+              <a:t>til</a:t>
+            </a:r>
+            <a:r>
+              <a:rPr lang="en-US">
+                <a:cs typeface="Calibri"/>
+              </a:rPr>
+              <a:t> </a:t>
+            </a:r>
+            <a:r>
+              <a:rPr lang="en-US" err="1">
+                <a:cs typeface="Calibri"/>
+              </a:rPr>
+              <a:t>ressurser</a:t>
+            </a:r>
+            <a:endParaRPr lang="en-US">
+              <a:cs typeface="Calibri"/>
+            </a:endParaRPr>
+          </a:p>
+          <a:p>
+            <a:pPr lvl="2"/>
+            <a:r>
+              <a:rPr lang="en-US">
+                <a:cs typeface="Calibri"/>
+              </a:rPr>
+              <a:t>Cosmos DB</a:t>
+            </a:r>
+          </a:p>
+          <a:p>
+            <a:pPr lvl="2"/>
+            <a:r>
+              <a:rPr lang="en-US">
+                <a:cs typeface="Calibri"/>
+              </a:rPr>
+              <a:t>Table Storage</a:t>
+            </a:r>
+          </a:p>
+          <a:p>
+            <a:pPr marL="0" indent="0">
+              <a:buNone/>
+            </a:pPr>
+            <a:endParaRPr lang="en-US">
+              <a:cs typeface="Calibri"/>
+            </a:endParaRPr>
+          </a:p>
+          <a:p>
+            <a:r>
+              <a:rPr lang="en-US">
+                <a:cs typeface="Calibri"/>
+              </a:rPr>
+              <a:t>Output binding</a:t>
+            </a:r>
+          </a:p>
+          <a:p>
+            <a:pPr lvl="1"/>
+            <a:r>
+              <a:rPr lang="en-US" err="1">
+                <a:cs typeface="Calibri"/>
+              </a:rPr>
+              <a:t>Hva</a:t>
+            </a:r>
+            <a:r>
+              <a:rPr lang="en-US">
+                <a:cs typeface="Calibri"/>
+              </a:rPr>
+              <a:t> </a:t>
+            </a:r>
+            <a:r>
+              <a:rPr lang="en-US" err="1">
+                <a:cs typeface="Calibri"/>
+              </a:rPr>
+              <a:t>skal</a:t>
+            </a:r>
+            <a:r>
+              <a:rPr lang="en-US">
+                <a:cs typeface="Calibri"/>
+              </a:rPr>
+              <a:t> </a:t>
+            </a:r>
+            <a:r>
+              <a:rPr lang="en-US" err="1">
+                <a:cs typeface="Calibri"/>
+              </a:rPr>
+              <a:t>produseres</a:t>
+            </a:r>
+            <a:endParaRPr lang="en-US">
+              <a:cs typeface="Calibri"/>
+            </a:endParaRPr>
+          </a:p>
+          <a:p>
+            <a:pPr lvl="2"/>
+            <a:r>
+              <a:rPr lang="en-US">
+                <a:cs typeface="Calibri"/>
+              </a:rPr>
+              <a:t>Cosmos DB / Table Storage / Blob Storage</a:t>
+            </a:r>
+          </a:p>
+          <a:p>
+            <a:pPr lvl="2"/>
+            <a:r>
+              <a:rPr lang="en-US" err="1">
+                <a:cs typeface="Calibri"/>
+              </a:rPr>
+              <a:t>En</a:t>
+            </a:r>
+            <a:r>
+              <a:rPr lang="en-US">
+                <a:cs typeface="Calibri"/>
+              </a:rPr>
+              <a:t> </a:t>
+            </a:r>
+            <a:r>
+              <a:rPr lang="en-US" err="1">
+                <a:cs typeface="Calibri"/>
+              </a:rPr>
+              <a:t>kømelding</a:t>
+            </a:r>
+            <a:endParaRPr lang="en-US">
+              <a:cs typeface="Calibri"/>
+            </a:endParaRPr>
           </a:p>
           <a:p>
             <a:endParaRPr lang="en-US">
@@ -12882,9 +12683,6 @@
               </a:rPr>
               <a:t>Azure Functions</a:t>
             </a:r>
-            <a:endParaRPr lang="en-US" dirty="0">
-              <a:cs typeface="Calibri Light"/>
-            </a:endParaRPr>
           </a:p>
         </p:txBody>
       </p:sp>
@@ -12910,7 +12708,7 @@
         </p:blipFill>
         <p:spPr>
           <a:xfrm>
-            <a:off x="4130749" y="1960844"/>
+            <a:off x="4698016" y="3004090"/>
             <a:ext cx="7456967" cy="1004733"/>
           </a:xfrm>
           <a:prstGeom prst="rect">
@@ -12940,7 +12738,7 @@
         </p:blipFill>
         <p:spPr>
           <a:xfrm>
-            <a:off x="4130749" y="3309384"/>
+            <a:off x="4698016" y="4141382"/>
             <a:ext cx="7456968" cy="1018953"/>
           </a:xfrm>
           <a:prstGeom prst="rect">
@@ -12962,7 +12760,7 @@
         </p:nvSpPr>
         <p:spPr>
           <a:xfrm>
-            <a:off x="6595729" y="2466753"/>
+            <a:off x="7154529" y="3506456"/>
             <a:ext cx="4749207" cy="256954"/>
           </a:xfrm>
           <a:prstGeom prst="rect">
@@ -13014,7 +12812,7 @@
         </p:nvSpPr>
         <p:spPr>
           <a:xfrm>
-            <a:off x="4495798" y="3928730"/>
+            <a:off x="5092698" y="4758463"/>
             <a:ext cx="5901068" cy="212652"/>
           </a:xfrm>
           <a:prstGeom prst="rect">
@@ -13066,7 +12864,7 @@
         </p:nvSpPr>
         <p:spPr>
           <a:xfrm>
-            <a:off x="4132519" y="2130055"/>
+            <a:off x="4698016" y="3172046"/>
             <a:ext cx="3650510" cy="256954"/>
           </a:xfrm>
           <a:prstGeom prst="rect">
@@ -14939,6 +14737,12 @@
 </file>
 
 <file path=customXml/item1.xml><?xml version="1.0" encoding="utf-8"?>
+<p:properties xmlns:p="http://schemas.microsoft.com/office/2006/metadata/properties" xmlns:xsi="http://www.w3.org/2001/XMLSchema-instance" xmlns:pc="http://schemas.microsoft.com/office/infopath/2007/PartnerControls">
+  <documentManagement/>
+</p:properties>
+</file>
+
+<file path=customXml/item2.xml><?xml version="1.0" encoding="utf-8"?>
 <?mso-contentType ?>
 <FormTemplates xmlns="http://schemas.microsoft.com/sharepoint/v3/contenttype/forms">
   <Display>DocumentLibraryForm</Display>
@@ -14947,17 +14751,11 @@
 </FormTemplates>
 </file>
 
-<file path=customXml/item2.xml><?xml version="1.0" encoding="utf-8"?>
-<p:properties xmlns:p="http://schemas.microsoft.com/office/2006/metadata/properties" xmlns:xsi="http://www.w3.org/2001/XMLSchema-instance" xmlns:pc="http://schemas.microsoft.com/office/infopath/2007/PartnerControls">
-  <documentManagement/>
-</p:properties>
-</file>
-
 <file path=customXml/item3.xml><?xml version="1.0" encoding="utf-8"?>
-<ct:contentTypeSchema xmlns:ct="http://schemas.microsoft.com/office/2006/metadata/contentType" xmlns:ma="http://schemas.microsoft.com/office/2006/metadata/properties/metaAttributes" ct:_="" ma:_="" ma:contentTypeName="Document" ma:contentTypeID="0x010100E9D85B9BA922BB4B85087FC750565ED3" ma:contentTypeVersion="11" ma:contentTypeDescription="Create a new document." ma:contentTypeScope="" ma:versionID="4f810c8ede77b4352abf3ce0a24aee22">
-  <xsd:schema xmlns:xsd="http://www.w3.org/2001/XMLSchema" xmlns:xs="http://www.w3.org/2001/XMLSchema" xmlns:p="http://schemas.microsoft.com/office/2006/metadata/properties" xmlns:ns3="46be8019-dd30-460b-80a3-53326b5b596f" xmlns:ns4="0271dd0a-d5fc-42c4-b96d-292d5177dc09" targetNamespace="http://schemas.microsoft.com/office/2006/metadata/properties" ma:root="true" ma:fieldsID="f1c1488e843bc3fb012b141811aa1836" ns3:_="" ns4:_="">
-    <xsd:import namespace="46be8019-dd30-460b-80a3-53326b5b596f"/>
-    <xsd:import namespace="0271dd0a-d5fc-42c4-b96d-292d5177dc09"/>
+<ct:contentTypeSchema xmlns:ct="http://schemas.microsoft.com/office/2006/metadata/contentType" xmlns:ma="http://schemas.microsoft.com/office/2006/metadata/properties/metaAttributes" ct:_="" ma:_="" ma:contentTypeName="Document" ma:contentTypeID="0x010100D8EA47127A574448ACD0F9C9D78B81D5" ma:contentTypeVersion="11" ma:contentTypeDescription="Create a new document." ma:contentTypeScope="" ma:versionID="afa1ce4cf657b6dfc411c9baebd60e93">
+  <xsd:schema xmlns:xsd="http://www.w3.org/2001/XMLSchema" xmlns:xs="http://www.w3.org/2001/XMLSchema" xmlns:p="http://schemas.microsoft.com/office/2006/metadata/properties" xmlns:ns3="aac78177-6534-49a2-b281-7a26515f646b" xmlns:ns4="7ba49632-979e-4ee1-aefd-7896aa63ba9e" targetNamespace="http://schemas.microsoft.com/office/2006/metadata/properties" ma:root="true" ma:fieldsID="2f469af1dd2afdb42613c02b83443f4e" ns3:_="" ns4:_="">
+    <xsd:import namespace="aac78177-6534-49a2-b281-7a26515f646b"/>
+    <xsd:import namespace="7ba49632-979e-4ee1-aefd-7896aa63ba9e"/>
     <xsd:element name="properties">
       <xsd:complexType>
         <xsd:sequence>
@@ -14967,14 +14765,14 @@
                 <xsd:element ref="ns3:MediaServiceMetadata" minOccurs="0"/>
                 <xsd:element ref="ns3:MediaServiceFastMetadata" minOccurs="0"/>
                 <xsd:element ref="ns3:MediaServiceAutoTags" minOccurs="0"/>
+                <xsd:element ref="ns3:MediaServiceOCR" minOccurs="0"/>
                 <xsd:element ref="ns3:MediaServiceGenerationTime" minOccurs="0"/>
                 <xsd:element ref="ns3:MediaServiceEventHashCode" minOccurs="0"/>
-                <xsd:element ref="ns3:MediaServiceOCR" minOccurs="0"/>
+                <xsd:element ref="ns3:MediaServiceDateTaken" minOccurs="0"/>
+                <xsd:element ref="ns3:MediaServiceLocation" minOccurs="0"/>
                 <xsd:element ref="ns4:SharedWithUsers" minOccurs="0"/>
                 <xsd:element ref="ns4:SharedWithDetails" minOccurs="0"/>
                 <xsd:element ref="ns4:SharingHintHash" minOccurs="0"/>
-                <xsd:element ref="ns3:MediaServiceDateTaken" minOccurs="0"/>
-                <xsd:element ref="ns3:MediaLengthInSeconds" minOccurs="0"/>
               </xsd:all>
             </xsd:complexType>
           </xsd:element>
@@ -14982,7 +14780,7 @@
       </xsd:complexType>
     </xsd:element>
   </xsd:schema>
-  <xsd:schema xmlns:xsd="http://www.w3.org/2001/XMLSchema" xmlns:xs="http://www.w3.org/2001/XMLSchema" xmlns:dms="http://schemas.microsoft.com/office/2006/documentManagement/types" xmlns:pc="http://schemas.microsoft.com/office/infopath/2007/PartnerControls" targetNamespace="46be8019-dd30-460b-80a3-53326b5b596f" elementFormDefault="qualified">
+  <xsd:schema xmlns:xsd="http://www.w3.org/2001/XMLSchema" xmlns:xs="http://www.w3.org/2001/XMLSchema" xmlns:dms="http://schemas.microsoft.com/office/2006/documentManagement/types" xmlns:pc="http://schemas.microsoft.com/office/infopath/2007/PartnerControls" targetNamespace="aac78177-6534-49a2-b281-7a26515f646b" elementFormDefault="qualified">
     <xsd:import namespace="http://schemas.microsoft.com/office/2006/documentManagement/types"/>
     <xsd:import namespace="http://schemas.microsoft.com/office/infopath/2007/PartnerControls"/>
     <xsd:element name="MediaServiceMetadata" ma:index="8" nillable="true" ma:displayName="MediaServiceMetadata" ma:hidden="true" ma:internalName="MediaServiceMetadata" ma:readOnly="true">
@@ -15000,38 +14798,38 @@
         <xsd:restriction base="dms:Text"/>
       </xsd:simpleType>
     </xsd:element>
-    <xsd:element name="MediaServiceGenerationTime" ma:index="11" nillable="true" ma:displayName="MediaServiceGenerationTime" ma:hidden="true" ma:internalName="MediaServiceGenerationTime" ma:readOnly="true">
-      <xsd:simpleType>
-        <xsd:restriction base="dms:Text"/>
-      </xsd:simpleType>
-    </xsd:element>
-    <xsd:element name="MediaServiceEventHashCode" ma:index="12" nillable="true" ma:displayName="MediaServiceEventHashCode" ma:hidden="true" ma:internalName="MediaServiceEventHashCode" ma:readOnly="true">
-      <xsd:simpleType>
-        <xsd:restriction base="dms:Text"/>
-      </xsd:simpleType>
-    </xsd:element>
-    <xsd:element name="MediaServiceOCR" ma:index="13" nillable="true" ma:displayName="Extracted Text" ma:internalName="MediaServiceOCR" ma:readOnly="true">
+    <xsd:element name="MediaServiceOCR" ma:index="11" nillable="true" ma:displayName="Extracted Text" ma:internalName="MediaServiceOCR" ma:readOnly="true">
       <xsd:simpleType>
         <xsd:restriction base="dms:Note">
           <xsd:maxLength value="255"/>
         </xsd:restriction>
       </xsd:simpleType>
     </xsd:element>
-    <xsd:element name="MediaServiceDateTaken" ma:index="17" nillable="true" ma:displayName="MediaServiceDateTaken" ma:hidden="true" ma:internalName="MediaServiceDateTaken" ma:readOnly="true">
+    <xsd:element name="MediaServiceGenerationTime" ma:index="12" nillable="true" ma:displayName="MediaServiceGenerationTime" ma:hidden="true" ma:internalName="MediaServiceGenerationTime" ma:readOnly="true">
       <xsd:simpleType>
         <xsd:restriction base="dms:Text"/>
       </xsd:simpleType>
     </xsd:element>
-    <xsd:element name="MediaLengthInSeconds" ma:index="18" nillable="true" ma:displayName="MediaLengthInSeconds" ma:hidden="true" ma:internalName="MediaLengthInSeconds" ma:readOnly="true">
+    <xsd:element name="MediaServiceEventHashCode" ma:index="13" nillable="true" ma:displayName="MediaServiceEventHashCode" ma:hidden="true" ma:internalName="MediaServiceEventHashCode" ma:readOnly="true">
       <xsd:simpleType>
-        <xsd:restriction base="dms:Unknown"/>
+        <xsd:restriction base="dms:Text"/>
+      </xsd:simpleType>
+    </xsd:element>
+    <xsd:element name="MediaServiceDateTaken" ma:index="14" nillable="true" ma:displayName="MediaServiceDateTaken" ma:hidden="true" ma:internalName="MediaServiceDateTaken" ma:readOnly="true">
+      <xsd:simpleType>
+        <xsd:restriction base="dms:Text"/>
+      </xsd:simpleType>
+    </xsd:element>
+    <xsd:element name="MediaServiceLocation" ma:index="15" nillable="true" ma:displayName="Location" ma:internalName="MediaServiceLocation" ma:readOnly="true">
+      <xsd:simpleType>
+        <xsd:restriction base="dms:Text"/>
       </xsd:simpleType>
     </xsd:element>
   </xsd:schema>
-  <xsd:schema xmlns:xsd="http://www.w3.org/2001/XMLSchema" xmlns:xs="http://www.w3.org/2001/XMLSchema" xmlns:dms="http://schemas.microsoft.com/office/2006/documentManagement/types" xmlns:pc="http://schemas.microsoft.com/office/infopath/2007/PartnerControls" targetNamespace="0271dd0a-d5fc-42c4-b96d-292d5177dc09" elementFormDefault="qualified">
+  <xsd:schema xmlns:xsd="http://www.w3.org/2001/XMLSchema" xmlns:xs="http://www.w3.org/2001/XMLSchema" xmlns:dms="http://schemas.microsoft.com/office/2006/documentManagement/types" xmlns:pc="http://schemas.microsoft.com/office/infopath/2007/PartnerControls" targetNamespace="7ba49632-979e-4ee1-aefd-7896aa63ba9e" elementFormDefault="qualified">
     <xsd:import namespace="http://schemas.microsoft.com/office/2006/documentManagement/types"/>
     <xsd:import namespace="http://schemas.microsoft.com/office/infopath/2007/PartnerControls"/>
-    <xsd:element name="SharedWithUsers" ma:index="14" nillable="true" ma:displayName="Shared With" ma:internalName="SharedWithUsers" ma:readOnly="true">
+    <xsd:element name="SharedWithUsers" ma:index="16" nillable="true" ma:displayName="Shared With" ma:internalName="SharedWithUsers" ma:readOnly="true">
       <xsd:complexType>
         <xsd:complexContent>
           <xsd:extension base="dms:UserMulti">
@@ -15050,14 +14848,14 @@
         </xsd:complexContent>
       </xsd:complexType>
     </xsd:element>
-    <xsd:element name="SharedWithDetails" ma:index="15" nillable="true" ma:displayName="Shared With Details" ma:internalName="SharedWithDetails" ma:readOnly="true">
+    <xsd:element name="SharedWithDetails" ma:index="17" nillable="true" ma:displayName="Shared With Details" ma:internalName="SharedWithDetails" ma:readOnly="true">
       <xsd:simpleType>
         <xsd:restriction base="dms:Note">
           <xsd:maxLength value="255"/>
         </xsd:restriction>
       </xsd:simpleType>
     </xsd:element>
-    <xsd:element name="SharingHintHash" ma:index="16" nillable="true" ma:displayName="Sharing Hint Hash" ma:hidden="true" ma:internalName="SharingHintHash" ma:readOnly="true">
+    <xsd:element name="SharingHintHash" ma:index="18" nillable="true" ma:displayName="Sharing Hint Hash" ma:hidden="true" ma:internalName="SharingHintHash" ma:readOnly="true">
       <xsd:simpleType>
         <xsd:restriction base="dms:Text"/>
       </xsd:simpleType>
@@ -15163,6 +14961,23 @@
 </file>
 
 <file path=customXml/itemProps1.xml><?xml version="1.0" encoding="utf-8"?>
+<ds:datastoreItem xmlns:ds="http://schemas.openxmlformats.org/officeDocument/2006/customXml" ds:itemID="{9D2CB842-18D5-4EEF-9009-B0CAFCE7AC3E}">
+  <ds:schemaRefs>
+    <ds:schemaRef ds:uri="7ba49632-979e-4ee1-aefd-7896aa63ba9e"/>
+    <ds:schemaRef ds:uri="aac78177-6534-49a2-b281-7a26515f646b"/>
+    <ds:schemaRef ds:uri="http://purl.org/dc/dcmitype/"/>
+    <ds:schemaRef ds:uri="http://purl.org/dc/elements/1.1/"/>
+    <ds:schemaRef ds:uri="http://purl.org/dc/terms/"/>
+    <ds:schemaRef ds:uri="http://schemas.microsoft.com/office/2006/documentManagement/types"/>
+    <ds:schemaRef ds:uri="http://schemas.microsoft.com/office/2006/metadata/properties"/>
+    <ds:schemaRef ds:uri="http://schemas.microsoft.com/office/infopath/2007/PartnerControls"/>
+    <ds:schemaRef ds:uri="http://schemas.openxmlformats.org/package/2006/metadata/core-properties"/>
+    <ds:schemaRef ds:uri="http://www.w3.org/XML/1998/namespace"/>
+  </ds:schemaRefs>
+</ds:datastoreItem>
+</file>
+
+<file path=customXml/itemProps2.xml><?xml version="1.0" encoding="utf-8"?>
 <ds:datastoreItem xmlns:ds="http://schemas.openxmlformats.org/officeDocument/2006/customXml" ds:itemID="{BB82CC63-55FC-4D22-9ED3-DB88AF6228E1}">
   <ds:schemaRefs>
     <ds:schemaRef ds:uri="http://schemas.microsoft.com/sharepoint/v3/contenttype/forms"/>
@@ -15170,38 +14985,21 @@
 </ds:datastoreItem>
 </file>
 
-<file path=customXml/itemProps2.xml><?xml version="1.0" encoding="utf-8"?>
-<ds:datastoreItem xmlns:ds="http://schemas.openxmlformats.org/officeDocument/2006/customXml" ds:itemID="{9D2CB842-18D5-4EEF-9009-B0CAFCE7AC3E}">
+<file path=customXml/itemProps3.xml><?xml version="1.0" encoding="utf-8"?>
+<ds:datastoreItem xmlns:ds="http://schemas.openxmlformats.org/officeDocument/2006/customXml" ds:itemID="{DC727022-2B1A-49F6-8E84-349E99168CB7}">
   <ds:schemaRefs>
-    <ds:schemaRef ds:uri="http://purl.org/dc/terms/"/>
-    <ds:schemaRef ds:uri="46be8019-dd30-460b-80a3-53326b5b596f"/>
-    <ds:schemaRef ds:uri="http://schemas.microsoft.com/office/2006/documentManagement/types"/>
-    <ds:schemaRef ds:uri="http://schemas.microsoft.com/office/infopath/2007/PartnerControls"/>
-    <ds:schemaRef ds:uri="0271dd0a-d5fc-42c4-b96d-292d5177dc09"/>
-    <ds:schemaRef ds:uri="http://purl.org/dc/elements/1.1/"/>
-    <ds:schemaRef ds:uri="http://schemas.microsoft.com/office/2006/metadata/properties"/>
-    <ds:schemaRef ds:uri="http://schemas.openxmlformats.org/package/2006/metadata/core-properties"/>
-    <ds:schemaRef ds:uri="http://www.w3.org/XML/1998/namespace"/>
-    <ds:schemaRef ds:uri="http://purl.org/dc/dcmitype/"/>
-  </ds:schemaRefs>
-</ds:datastoreItem>
-</file>
-
-<file path=customXml/itemProps3.xml><?xml version="1.0" encoding="utf-8"?>
-<ds:datastoreItem xmlns:ds="http://schemas.openxmlformats.org/officeDocument/2006/customXml" ds:itemID="{367A22F7-AF8F-4F34-B4FC-4AC00A8C2BCB}">
-  <ds:schemaRefs>
-    <ds:schemaRef ds:uri="http://schemas.microsoft.com/office/2006/metadata/contentType"/>
-    <ds:schemaRef ds:uri="http://schemas.microsoft.com/office/2006/metadata/properties/metaAttributes"/>
-    <ds:schemaRef ds:uri="http://www.w3.org/2001/XMLSchema"/>
-    <ds:schemaRef ds:uri="http://schemas.microsoft.com/office/2006/metadata/properties"/>
-    <ds:schemaRef ds:uri="46be8019-dd30-460b-80a3-53326b5b596f"/>
-    <ds:schemaRef ds:uri="0271dd0a-d5fc-42c4-b96d-292d5177dc09"/>
-    <ds:schemaRef ds:uri="http://schemas.microsoft.com/office/2006/documentManagement/types"/>
-    <ds:schemaRef ds:uri="http://schemas.microsoft.com/office/infopath/2007/PartnerControls"/>
-    <ds:schemaRef ds:uri="http://schemas.openxmlformats.org/package/2006/metadata/core-properties"/>
+    <ds:schemaRef ds:uri="7ba49632-979e-4ee1-aefd-7896aa63ba9e"/>
+    <ds:schemaRef ds:uri="aac78177-6534-49a2-b281-7a26515f646b"/>
     <ds:schemaRef ds:uri="http://purl.org/dc/elements/1.1/"/>
     <ds:schemaRef ds:uri="http://purl.org/dc/terms/"/>
     <ds:schemaRef ds:uri="http://schemas.microsoft.com/internal/obd"/>
+    <ds:schemaRef ds:uri="http://schemas.microsoft.com/office/2006/documentManagement/types"/>
+    <ds:schemaRef ds:uri="http://schemas.microsoft.com/office/2006/metadata/contentType"/>
+    <ds:schemaRef ds:uri="http://schemas.microsoft.com/office/2006/metadata/properties"/>
+    <ds:schemaRef ds:uri="http://schemas.microsoft.com/office/2006/metadata/properties/metaAttributes"/>
+    <ds:schemaRef ds:uri="http://schemas.microsoft.com/office/infopath/2007/PartnerControls"/>
+    <ds:schemaRef ds:uri="http://schemas.openxmlformats.org/package/2006/metadata/core-properties"/>
+    <ds:schemaRef ds:uri="http://www.w3.org/2001/XMLSchema"/>
   </ds:schemaRefs>
 </ds:datastoreItem>
 </file>
</xml_diff>